<commit_message>
added pda screengrabs x2
</commit_message>
<xml_diff>
--- a/presentation/js_group_project_presentation.pptx
+++ b/presentation/js_group_project_presentation.pptx
@@ -79,7 +79,7 @@
         <p:txBody>
           <a:bodyPr/>
           <a:p>
-            <a:fld id="{7699E45B-CD61-4453-A48B-FB3BBBF60A81}" type="slidenum">
+            <a:fld id="{8364B93A-A877-4421-964D-FEA92123EA94}" type="slidenum">
               <a:t>&lt;#&gt;</a:t>
             </a:fld>
           </a:p>
@@ -288,7 +288,7 @@
         <p:txBody>
           <a:bodyPr/>
           <a:p>
-            <a:fld id="{EFADBFEC-E792-4914-A0FA-BC770C7B23EE}" type="slidenum">
+            <a:fld id="{BC4A5C2B-1397-44B6-A140-F59BF968F40C}" type="slidenum">
               <a:t>&lt;#&gt;</a:t>
             </a:fld>
           </a:p>
@@ -583,7 +583,7 @@
         <p:txBody>
           <a:bodyPr/>
           <a:p>
-            <a:fld id="{04147862-1A7F-47EA-973A-13C1813F5436}" type="slidenum">
+            <a:fld id="{76E8EAD9-74F5-416E-8C6D-C1E09F868505}" type="slidenum">
               <a:t>&lt;#&gt;</a:t>
             </a:fld>
           </a:p>
@@ -964,7 +964,7 @@
         <p:txBody>
           <a:bodyPr/>
           <a:p>
-            <a:fld id="{EAA29A09-1FA9-426E-9A8E-7FE609311F6D}" type="slidenum">
+            <a:fld id="{6A02A6F8-9D86-4358-9835-A2A24A5ED677}" type="slidenum">
               <a:t>&lt;#&gt;</a:t>
             </a:fld>
           </a:p>
@@ -1047,7 +1047,7 @@
         <p:txBody>
           <a:bodyPr/>
           <a:p>
-            <a:fld id="{604D5ED3-7DFF-4550-AE21-D80836115D74}" type="slidenum">
+            <a:fld id="{8E3B89DB-F26D-4236-B5BE-F8DF26DC3327}" type="slidenum">
               <a:t>&lt;#&gt;</a:t>
             </a:fld>
           </a:p>
@@ -1210,7 +1210,7 @@
         <p:txBody>
           <a:bodyPr/>
           <a:p>
-            <a:fld id="{52E9DFD0-9E6E-4673-A23B-13586F172880}" type="slidenum">
+            <a:fld id="{CA042659-A87E-4381-816D-A77E68F067AC}" type="slidenum">
               <a:t>&lt;#&gt;</a:t>
             </a:fld>
           </a:p>
@@ -1376,7 +1376,7 @@
         <p:txBody>
           <a:bodyPr/>
           <a:p>
-            <a:fld id="{AFDB118D-4BAB-4F7C-A93D-3F2D8B92F886}" type="slidenum">
+            <a:fld id="{BBA50AD7-B908-4A50-B2BF-52ADBE714BA8}" type="slidenum">
               <a:t>&lt;#&gt;</a:t>
             </a:fld>
           </a:p>
@@ -1585,7 +1585,7 @@
         <p:txBody>
           <a:bodyPr/>
           <a:p>
-            <a:fld id="{ABB19E97-BE32-44FA-A378-B5C55AC5260D}" type="slidenum">
+            <a:fld id="{BC84E67D-854C-469A-AF59-2EE3E33E7AD7}" type="slidenum">
               <a:t>&lt;#&gt;</a:t>
             </a:fld>
           </a:p>
@@ -1708,7 +1708,7 @@
         <p:txBody>
           <a:bodyPr/>
           <a:p>
-            <a:fld id="{5737B686-35D5-483C-A33E-E84345AF4D59}" type="slidenum">
+            <a:fld id="{F38CDC02-AA5F-4F14-AF6F-F6B94914F679}" type="slidenum">
               <a:t>&lt;#&gt;</a:t>
             </a:fld>
           </a:p>
@@ -1829,7 +1829,7 @@
         <p:txBody>
           <a:bodyPr/>
           <a:p>
-            <a:fld id="{ECC855D3-75AD-4DB2-B123-34C73EAA8113}" type="slidenum">
+            <a:fld id="{6157ED03-1768-4811-B80B-F29A7349BE40}" type="slidenum">
               <a:t>&lt;#&gt;</a:t>
             </a:fld>
           </a:p>
@@ -2081,7 +2081,7 @@
         <p:txBody>
           <a:bodyPr/>
           <a:p>
-            <a:fld id="{7B986B12-06DF-4206-AD8C-43DE1D6FBC83}" type="slidenum">
+            <a:fld id="{1F0F41EC-ABC7-4B25-B379-214D485968A4}" type="slidenum">
               <a:t>&lt;#&gt;</a:t>
             </a:fld>
           </a:p>
@@ -2244,7 +2244,7 @@
         <p:txBody>
           <a:bodyPr/>
           <a:p>
-            <a:fld id="{DB71585D-8398-443C-89D4-0FA632721A31}" type="slidenum">
+            <a:fld id="{95A9AA94-0A28-4454-8BEE-1815F0D0060E}" type="slidenum">
               <a:t>&lt;#&gt;</a:t>
             </a:fld>
           </a:p>
@@ -2496,7 +2496,7 @@
         <p:txBody>
           <a:bodyPr/>
           <a:p>
-            <a:fld id="{2D20C6B9-DC32-4DE0-A355-A8751E99DEDD}" type="slidenum">
+            <a:fld id="{8D9E6AD0-B1B5-42F9-B0E7-E4FEB145B07C}" type="slidenum">
               <a:t>&lt;#&gt;</a:t>
             </a:fld>
           </a:p>
@@ -2748,7 +2748,7 @@
         <p:txBody>
           <a:bodyPr/>
           <a:p>
-            <a:fld id="{2ADD2BF8-53AB-49EE-B0E6-32B8319A6926}" type="slidenum">
+            <a:fld id="{AC46DB82-63A2-412F-8DD3-0406DAAF1916}" type="slidenum">
               <a:t>&lt;#&gt;</a:t>
             </a:fld>
           </a:p>
@@ -2957,7 +2957,7 @@
         <p:txBody>
           <a:bodyPr/>
           <a:p>
-            <a:fld id="{10B0FFD7-0AC8-42B6-9F54-0DABC706459A}" type="slidenum">
+            <a:fld id="{38BA3AFE-CDCA-4072-8E18-8E884540D5F3}" type="slidenum">
               <a:t>&lt;#&gt;</a:t>
             </a:fld>
           </a:p>
@@ -3252,7 +3252,7 @@
         <p:txBody>
           <a:bodyPr/>
           <a:p>
-            <a:fld id="{264E6C1F-22A8-4D6C-9410-94A3D5AE60F9}" type="slidenum">
+            <a:fld id="{23D28807-414E-43F4-9EDF-60DE2BEA9B47}" type="slidenum">
               <a:t>&lt;#&gt;</a:t>
             </a:fld>
           </a:p>
@@ -3633,7 +3633,7 @@
         <p:txBody>
           <a:bodyPr/>
           <a:p>
-            <a:fld id="{C735E653-FA02-4B5A-A63D-53D347B0747E}" type="slidenum">
+            <a:fld id="{50A83D96-F3B4-4FA1-92D6-2182B263E5F4}" type="slidenum">
               <a:t>&lt;#&gt;</a:t>
             </a:fld>
           </a:p>
@@ -3799,7 +3799,7 @@
         <p:txBody>
           <a:bodyPr/>
           <a:p>
-            <a:fld id="{6CF28DFC-647D-434B-BD42-EDD496966474}" type="slidenum">
+            <a:fld id="{884920BE-A749-4771-AADE-3D7CC8CFC1AA}" type="slidenum">
               <a:t>&lt;#&gt;</a:t>
             </a:fld>
           </a:p>
@@ -4008,7 +4008,7 @@
         <p:txBody>
           <a:bodyPr/>
           <a:p>
-            <a:fld id="{A37F7B86-80EA-4597-810C-CE5AA2F977D4}" type="slidenum">
+            <a:fld id="{9F6F43A2-749C-4915-BE05-93BE0773D5BA}" type="slidenum">
               <a:t>&lt;#&gt;</a:t>
             </a:fld>
           </a:p>
@@ -4131,7 +4131,7 @@
         <p:txBody>
           <a:bodyPr/>
           <a:p>
-            <a:fld id="{4451CE21-C728-4AB5-8E84-C23B3D305DF1}" type="slidenum">
+            <a:fld id="{DFAB4DD7-0B7B-41C1-B63A-4F0D76BA0EC3}" type="slidenum">
               <a:t>&lt;#&gt;</a:t>
             </a:fld>
           </a:p>
@@ -4252,7 +4252,7 @@
         <p:txBody>
           <a:bodyPr/>
           <a:p>
-            <a:fld id="{0466DB26-51F2-4BDA-A319-3DAB6E142DB2}" type="slidenum">
+            <a:fld id="{7120D597-D642-4AF1-A449-77A55597AA20}" type="slidenum">
               <a:t>&lt;#&gt;</a:t>
             </a:fld>
           </a:p>
@@ -4504,7 +4504,7 @@
         <p:txBody>
           <a:bodyPr/>
           <a:p>
-            <a:fld id="{977FAAD0-979F-40EA-A739-77960F9FFA4F}" type="slidenum">
+            <a:fld id="{0BF91080-C8BB-45E0-897A-E40309A847BF}" type="slidenum">
               <a:t>&lt;#&gt;</a:t>
             </a:fld>
           </a:p>
@@ -4756,7 +4756,7 @@
         <p:txBody>
           <a:bodyPr/>
           <a:p>
-            <a:fld id="{DCB7D809-F80E-441D-AF34-78CCF2B0BDB3}" type="slidenum">
+            <a:fld id="{CBD29DF8-B333-4535-B432-1C3357A9FBFB}" type="slidenum">
               <a:t>&lt;#&gt;</a:t>
             </a:fld>
           </a:p>
@@ -5008,7 +5008,7 @@
         <p:txBody>
           <a:bodyPr/>
           <a:p>
-            <a:fld id="{24112AB4-5C85-4B08-AFB4-2355039F29F8}" type="slidenum">
+            <a:fld id="{9DEFEC4A-B784-4465-99A3-F788D279A035}" type="slidenum">
               <a:t>&lt;#&gt;</a:t>
             </a:fld>
           </a:p>
@@ -6067,7 +6067,7 @@
                 <a:tab algn="l" pos="0"/>
               </a:tabLst>
             </a:pPr>
-            <a:fld id="{E12FB8F2-1AAD-4116-BC71-43BD807549ED}" type="slidenum">
+            <a:fld id="{BDA68456-0A96-4A4D-B8B5-C54AF4177121}" type="slidenum">
               <a:rPr b="0" lang="en-GB" sz="1400" spc="-1" strike="noStrike">
                 <a:solidFill>
                   <a:srgbClr val="000000"/>
@@ -7740,7 +7740,7 @@
                 <a:tab algn="l" pos="0"/>
               </a:tabLst>
             </a:pPr>
-            <a:fld id="{F0C99CA0-0423-4258-B899-34DE2CACF117}" type="slidenum">
+            <a:fld id="{3A23178C-E40D-48C1-9AEE-2769ED12B420}" type="slidenum">
               <a:rPr b="0" lang="en-GB" sz="1400" spc="-1" strike="noStrike">
                 <a:solidFill>
                   <a:srgbClr val="000000"/>
@@ -7897,7 +7897,7 @@
         <p:txBody>
           <a:bodyPr/>
           <a:p>
-            <a:fld id="{7A24BFE7-6C38-4A44-A4C9-2361442B27C4}" type="slidenum">
+            <a:fld id="{8FEA13F2-B6A2-4424-99A6-884209305479}" type="slidenum">
               <a:t>1</a:t>
             </a:fld>
           </a:p>
@@ -8290,7 +8290,7 @@
         <p:txBody>
           <a:bodyPr/>
           <a:p>
-            <a:fld id="{99BD6E55-C071-473F-9028-267B58BC8D98}" type="slidenum">
+            <a:fld id="{25FDB06C-0A1E-4DFF-9D66-3BC69482EAD7}" type="slidenum">
               <a:t>10</a:t>
             </a:fld>
           </a:p>
@@ -8928,7 +8928,7 @@
         <p:txBody>
           <a:bodyPr/>
           <a:p>
-            <a:fld id="{8CA36078-2AED-406B-BDF5-98E8E4D9491F}" type="slidenum">
+            <a:fld id="{9FF1892D-72CB-4BFC-A956-D6DA8DF523D4}" type="slidenum">
               <a:t>11</a:t>
             </a:fld>
           </a:p>
@@ -9366,7 +9366,7 @@
         <p:txBody>
           <a:bodyPr/>
           <a:p>
-            <a:fld id="{42C2AB9F-2FB9-4229-9F77-D438CA37C9F7}" type="slidenum">
+            <a:fld id="{4B62AB53-1288-46B3-B969-B013E0E8D93F}" type="slidenum">
               <a:t>12</a:t>
             </a:fld>
           </a:p>
@@ -9823,7 +9823,7 @@
         <p:txBody>
           <a:bodyPr/>
           <a:p>
-            <a:fld id="{5993731A-4B11-49B4-8524-ABFB286C3D53}" type="slidenum">
+            <a:fld id="{6C599526-F3C6-4994-B7ED-B14526E30770}" type="slidenum">
               <a:t>13</a:t>
             </a:fld>
           </a:p>
@@ -10310,7 +10310,7 @@
         <p:txBody>
           <a:bodyPr/>
           <a:p>
-            <a:fld id="{B744C76A-E1BC-4582-8B19-86414D8B5821}" type="slidenum">
+            <a:fld id="{92DF60BA-FC53-4752-922B-8B70E80C15B5}" type="slidenum">
               <a:t>14</a:t>
             </a:fld>
           </a:p>
@@ -10776,7 +10776,7 @@
         <p:txBody>
           <a:bodyPr/>
           <a:p>
-            <a:fld id="{1C7A7CC8-C681-4306-B7EE-A7BCCBF3F9E0}" type="slidenum">
+            <a:fld id="{C86A8093-50B2-43D4-9473-1310C8E8B3FE}" type="slidenum">
               <a:t>15</a:t>
             </a:fld>
           </a:p>
@@ -11189,7 +11189,7 @@
         <p:txBody>
           <a:bodyPr/>
           <a:p>
-            <a:fld id="{707F00E6-D2E5-40D1-9B1D-B05909121601}" type="slidenum">
+            <a:fld id="{13F296C7-FD69-4BBE-89A7-B039B881CB63}" type="slidenum">
               <a:t>16</a:t>
             </a:fld>
           </a:p>
@@ -11489,7 +11489,7 @@
         <p:txBody>
           <a:bodyPr/>
           <a:p>
-            <a:fld id="{B69A5362-3013-4BB0-B43F-0E3690ABB123}" type="slidenum">
+            <a:fld id="{310AC6C8-B279-4B19-BCB1-4E59CD6C791C}" type="slidenum">
               <a:t>2</a:t>
             </a:fld>
           </a:p>
@@ -11777,7 +11777,7 @@
         <p:txBody>
           <a:bodyPr/>
           <a:p>
-            <a:fld id="{EC916109-AEE4-4233-96B6-5F1A061B27F7}" type="slidenum">
+            <a:fld id="{9BF677A0-1C88-41DA-99FF-BA6661154861}" type="slidenum">
               <a:t>3</a:t>
             </a:fld>
           </a:p>
@@ -12076,7 +12076,7 @@
         <p:txBody>
           <a:bodyPr/>
           <a:p>
-            <a:fld id="{432416CB-995E-4554-8148-FECAFADBD0D8}" type="slidenum">
+            <a:fld id="{93098589-4709-45A5-86F2-E6DB63E395DF}" type="slidenum">
               <a:t>4</a:t>
             </a:fld>
           </a:p>
@@ -12413,7 +12413,7 @@
         <p:txBody>
           <a:bodyPr/>
           <a:p>
-            <a:fld id="{009F1150-7E53-4554-90A8-B699D52EDC65}" type="slidenum">
+            <a:fld id="{FB1B5002-3EFA-4295-BECC-EE1AE21992D0}" type="slidenum">
               <a:t>5</a:t>
             </a:fld>
           </a:p>
@@ -12534,7 +12534,7 @@
         </p:nvSpPr>
         <p:spPr>
           <a:xfrm>
-            <a:off x="360" y="412200"/>
+            <a:off x="361080" y="180000"/>
             <a:ext cx="9719640" cy="4987800"/>
           </a:xfrm>
           <a:prstGeom prst="rect">
@@ -12698,7 +12698,7 @@
         <p:txBody>
           <a:bodyPr/>
           <a:p>
-            <a:fld id="{B5A888E4-503E-4748-938A-8888769F9A5D}" type="slidenum">
+            <a:fld id="{69D69C83-6C4E-4277-A810-7222964621BB}" type="slidenum">
               <a:t>6</a:t>
             </a:fld>
           </a:p>
@@ -13150,7 +13150,7 @@
         <p:txBody>
           <a:bodyPr/>
           <a:p>
-            <a:fld id="{5F7AA1F0-3A4E-4A1A-A277-2B87A8EB36F5}" type="slidenum">
+            <a:fld id="{E166DE85-4071-44E2-BC9D-00C02E2D413F}" type="slidenum">
               <a:t>7</a:t>
             </a:fld>
           </a:p>
@@ -13626,7 +13626,7 @@
         <p:txBody>
           <a:bodyPr/>
           <a:p>
-            <a:fld id="{56E56A5D-1A0D-4566-98B5-6A39263D522E}" type="slidenum">
+            <a:fld id="{BCA7F097-E7CE-444D-82E2-81F107ED2CF6}" type="slidenum">
               <a:t>8</a:t>
             </a:fld>
           </a:p>
@@ -14034,7 +14034,7 @@
         <p:txBody>
           <a:bodyPr/>
           <a:p>
-            <a:fld id="{5EACE417-E56D-492E-81D5-1CEDD71B0675}" type="slidenum">
+            <a:fld id="{6CBA067C-A721-467F-A67A-6177EDB6488B}" type="slidenum">
               <a:t>9</a:t>
             </a:fld>
           </a:p>

</xml_diff>